<commit_message>
Update Herança e Porlimosfismo.pptx
</commit_message>
<xml_diff>
--- a/Projetos de Software/Aula 11 - Herança e Porfimorfismo/Herança e Porlimosfismo.pptx
+++ b/Projetos de Software/Aula 11 - Herança e Porfimorfismo/Herança e Porlimosfismo.pptx
@@ -227,7 +227,7 @@
           <a:p>
             <a:fld id="{FCBB45FB-FC1C-4893-B550-48C1193193C6}" type="datetimeFigureOut">
               <a:rPr lang="pt-BR" smtClean="0"/>
-              <a:t>09/03/2025</a:t>
+              <a:t>24/03/2025</a:t>
             </a:fld>
             <a:endParaRPr lang="pt-BR"/>
           </a:p>
@@ -930,7 +930,7 @@
           <a:p>
             <a:fld id="{CDD55C27-F8C6-4481-8569-CAC50CAE9F1F}" type="datetimeFigureOut">
               <a:rPr lang="pt-BR" smtClean="0"/>
-              <a:t>09/03/2025</a:t>
+              <a:t>24/03/2025</a:t>
             </a:fld>
             <a:endParaRPr lang="pt-BR"/>
           </a:p>
@@ -1429,7 +1429,7 @@
           <a:p>
             <a:fld id="{CDD55C27-F8C6-4481-8569-CAC50CAE9F1F}" type="datetimeFigureOut">
               <a:rPr lang="pt-BR" smtClean="0"/>
-              <a:t>09/03/2025</a:t>
+              <a:t>24/03/2025</a:t>
             </a:fld>
             <a:endParaRPr lang="pt-BR"/>
           </a:p>
@@ -1732,7 +1732,7 @@
           <a:p>
             <a:fld id="{CDD55C27-F8C6-4481-8569-CAC50CAE9F1F}" type="datetimeFigureOut">
               <a:rPr lang="pt-BR" smtClean="0"/>
-              <a:t>09/03/2025</a:t>
+              <a:t>24/03/2025</a:t>
             </a:fld>
             <a:endParaRPr lang="pt-BR"/>
           </a:p>
@@ -2183,7 +2183,7 @@
           <a:p>
             <a:fld id="{CDD55C27-F8C6-4481-8569-CAC50CAE9F1F}" type="datetimeFigureOut">
               <a:rPr lang="pt-BR" smtClean="0"/>
-              <a:t>09/03/2025</a:t>
+              <a:t>24/03/2025</a:t>
             </a:fld>
             <a:endParaRPr lang="pt-BR"/>
           </a:p>
@@ -2356,7 +2356,7 @@
           <a:p>
             <a:fld id="{CDD55C27-F8C6-4481-8569-CAC50CAE9F1F}" type="datetimeFigureOut">
               <a:rPr lang="pt-BR" smtClean="0"/>
-              <a:t>09/03/2025</a:t>
+              <a:t>24/03/2025</a:t>
             </a:fld>
             <a:endParaRPr lang="pt-BR"/>
           </a:p>
@@ -2493,7 +2493,7 @@
           <a:p>
             <a:fld id="{CDD55C27-F8C6-4481-8569-CAC50CAE9F1F}" type="datetimeFigureOut">
               <a:rPr lang="pt-BR" smtClean="0"/>
-              <a:t>09/03/2025</a:t>
+              <a:t>24/03/2025</a:t>
             </a:fld>
             <a:endParaRPr lang="pt-BR"/>
           </a:p>
@@ -2837,7 +2837,7 @@
           <a:p>
             <a:fld id="{CDD55C27-F8C6-4481-8569-CAC50CAE9F1F}" type="datetimeFigureOut">
               <a:rPr lang="pt-BR" smtClean="0"/>
-              <a:t>09/03/2025</a:t>
+              <a:t>24/03/2025</a:t>
             </a:fld>
             <a:endParaRPr lang="pt-BR"/>
           </a:p>
@@ -3158,7 +3158,7 @@
           <a:p>
             <a:fld id="{CDD55C27-F8C6-4481-8569-CAC50CAE9F1F}" type="datetimeFigureOut">
               <a:rPr lang="pt-BR" smtClean="0"/>
-              <a:t>09/03/2025</a:t>
+              <a:t>24/03/2025</a:t>
             </a:fld>
             <a:endParaRPr lang="pt-BR"/>
           </a:p>
@@ -5335,7 +5335,7 @@
               <a:t> </a:t>
             </a:r>
             <a:r>
-              <a:rPr lang="pt-BR" sz="1600" u="sng" dirty="0" err="1">
+              <a:rPr lang="pt-BR" sz="1600" dirty="0" err="1">
                 <a:solidFill>
                   <a:srgbClr val="0000C0"/>
                 </a:solidFill>

</xml_diff>